<commit_message>
WIP on adding concept-enforcement to the presentation
</commit_message>
<xml_diff>
--- a/CRTP.pptx
+++ b/CRTP.pptx
@@ -5,7 +5,7 @@
     <p:sldMasterId id="2147483804" r:id="rId1"/>
   </p:sldMasterIdLst>
   <p:notesMasterIdLst>
-    <p:notesMasterId r:id="rId14"/>
+    <p:notesMasterId r:id="rId16"/>
   </p:notesMasterIdLst>
   <p:sldIdLst>
     <p:sldId id="256" r:id="rId2"/>
@@ -19,7 +19,9 @@
     <p:sldId id="264" r:id="rId10"/>
     <p:sldId id="265" r:id="rId11"/>
     <p:sldId id="270" r:id="rId12"/>
-    <p:sldId id="271" r:id="rId13"/>
+    <p:sldId id="275" r:id="rId13"/>
+    <p:sldId id="276" r:id="rId14"/>
+    <p:sldId id="271" r:id="rId15"/>
   </p:sldIdLst>
   <p:sldSz cx="12192000" cy="6858000"/>
   <p:notesSz cx="6858000" cy="9144000"/>
@@ -602,112 +604,6 @@
           <a:lstStyle/>
           <a:p>
             <a:pPr rtl="0"/>
-            <a:r>
-              <a:rPr lang="en-US" sz="1200" b="0" i="0" u="none" strike="noStrike" kern="1200" dirty="0">
-                <a:solidFill>
-                  <a:schemeClr val="tx1"/>
-                </a:solidFill>
-                <a:effectLst/>
-                <a:latin typeface="+mn-lt"/>
-                <a:ea typeface="+mn-ea"/>
-                <a:cs typeface="+mn-cs"/>
-              </a:rPr>
-              <a:t>Example pulled from “C++ Template Metaprogramming: Concepts, Tools, and Techniques from Boost and Beyond” chapter 9, section 8</a:t>
-            </a:r>
-            <a:endParaRPr lang="en-US" dirty="0">
-              <a:effectLst/>
-            </a:endParaRPr>
-          </a:p>
-          <a:p>
-            <a:pPr rtl="0"/>
-            <a:r>
-              <a:rPr lang="en-US" sz="1200" b="0" i="0" u="sng" strike="noStrike" kern="1200" dirty="0">
-                <a:solidFill>
-                  <a:schemeClr val="tx1"/>
-                </a:solidFill>
-                <a:effectLst/>
-                <a:latin typeface="+mn-lt"/>
-                <a:ea typeface="+mn-ea"/>
-                <a:cs typeface="+mn-cs"/>
-                <a:hlinkClick r:id="rId3"/>
-              </a:rPr>
-              <a:t>Aleksey </a:t>
-            </a:r>
-            <a:r>
-              <a:rPr lang="en-US" sz="1200" b="0" i="0" u="sng" strike="noStrike" kern="1200" dirty="0" err="1">
-                <a:solidFill>
-                  <a:schemeClr val="tx1"/>
-                </a:solidFill>
-                <a:effectLst/>
-                <a:latin typeface="+mn-lt"/>
-                <a:ea typeface="+mn-ea"/>
-                <a:cs typeface="+mn-cs"/>
-                <a:hlinkClick r:id="rId3"/>
-              </a:rPr>
-              <a:t>Gurtovoy</a:t>
-            </a:r>
-            <a:r>
-              <a:rPr lang="en-US" sz="1200" b="0" i="0" u="none" strike="noStrike" kern="1200" dirty="0">
-                <a:solidFill>
-                  <a:schemeClr val="tx1"/>
-                </a:solidFill>
-                <a:effectLst/>
-                <a:latin typeface="+mn-lt"/>
-                <a:ea typeface="+mn-ea"/>
-                <a:cs typeface="+mn-cs"/>
-              </a:rPr>
-              <a:t>,</a:t>
-            </a:r>
-            <a:r>
-              <a:rPr lang="en-US" sz="1200" b="0" i="0" u="none" strike="noStrike" kern="1200" dirty="0">
-                <a:solidFill>
-                  <a:schemeClr val="tx1"/>
-                </a:solidFill>
-                <a:effectLst/>
-                <a:latin typeface="+mn-lt"/>
-                <a:ea typeface="+mn-ea"/>
-                <a:cs typeface="+mn-cs"/>
-                <a:hlinkClick r:id="rId4"/>
-              </a:rPr>
-              <a:t> </a:t>
-            </a:r>
-            <a:r>
-              <a:rPr lang="en-US" sz="1200" b="0" i="0" u="sng" strike="noStrike" kern="1200" dirty="0">
-                <a:solidFill>
-                  <a:schemeClr val="tx1"/>
-                </a:solidFill>
-                <a:effectLst/>
-                <a:latin typeface="+mn-lt"/>
-                <a:ea typeface="+mn-ea"/>
-                <a:cs typeface="+mn-cs"/>
-                <a:hlinkClick r:id="rId4"/>
-              </a:rPr>
-              <a:t>David Abrahams</a:t>
-            </a:r>
-            <a:br>
-              <a:rPr lang="en-US" sz="1200" b="0" i="0" u="none" strike="noStrike" kern="1200" dirty="0">
-                <a:solidFill>
-                  <a:schemeClr val="tx1"/>
-                </a:solidFill>
-                <a:effectLst/>
-                <a:latin typeface="+mn-lt"/>
-                <a:ea typeface="+mn-ea"/>
-                <a:cs typeface="+mn-cs"/>
-                <a:hlinkClick r:id="rId4"/>
-              </a:rPr>
-            </a:br>
-            <a:r>
-              <a:rPr lang="en-US" sz="1200" b="0" i="0" u="none" strike="noStrike" kern="1200" dirty="0">
-                <a:solidFill>
-                  <a:schemeClr val="tx1"/>
-                </a:solidFill>
-                <a:effectLst/>
-                <a:latin typeface="+mn-lt"/>
-                <a:ea typeface="+mn-ea"/>
-                <a:cs typeface="+mn-cs"/>
-              </a:rPr>
-              <a:t>https://www.safaribooksonline.com/library/view/c-template-metaprogramming/0321227255/</a:t>
-            </a:r>
             <a:endParaRPr lang="en-US" dirty="0">
               <a:effectLst/>
             </a:endParaRPr>
@@ -794,117 +690,219 @@
           <a:bodyPr/>
           <a:lstStyle/>
           <a:p>
+            <a:pPr marL="0" marR="0" lvl="0" indent="0" algn="l" defTabSz="914400" rtl="0" eaLnBrk="1" fontAlgn="auto" latinLnBrk="0" hangingPunct="1">
+              <a:lnSpc>
+                <a:spcPct val="100000"/>
+              </a:lnSpc>
+              <a:spcBef>
+                <a:spcPts val="0"/>
+              </a:spcBef>
+              <a:spcAft>
+                <a:spcPts val="0"/>
+              </a:spcAft>
+              <a:buClrTx/>
+              <a:buSzTx/>
+              <a:buFontTx/>
+              <a:buNone/>
+              <a:tabLst/>
+              <a:defRPr/>
+            </a:pPr>
+            <a:r>
+              <a:rPr lang="en-US" dirty="0"/>
+              <a:t>With base&lt;derived&gt;::bar() being called, it gets compiled, but the compiler still chooses not to compile base&lt;derived&gt;::foo(), since it is not called in the program</a:t>
+            </a:r>
+          </a:p>
+        </p:txBody>
+      </p:sp>
+      <p:sp>
+        <p:nvSpPr>
+          <p:cNvPr id="4" name="Slide Number Placeholder 3"/>
+          <p:cNvSpPr>
+            <a:spLocks noGrp="1"/>
+          </p:cNvSpPr>
+          <p:nvPr>
+            <p:ph type="sldNum" sz="quarter" idx="10"/>
+          </p:nvPr>
+        </p:nvSpPr>
+        <p:spPr/>
+        <p:txBody>
+          <a:bodyPr/>
+          <a:lstStyle/>
+          <a:p>
+            <a:fld id="{07CFD0BC-341E-4884-8712-9D9DE84DAC90}" type="slidenum">
+              <a:rPr lang="en-US" smtClean="0"/>
+              <a:t>12</a:t>
+            </a:fld>
+            <a:endParaRPr lang="en-US"/>
+          </a:p>
+        </p:txBody>
+      </p:sp>
+    </p:spTree>
+    <p:extLst>
+      <p:ext uri="{BB962C8B-B14F-4D97-AF65-F5344CB8AC3E}">
+        <p14:creationId xmlns:p14="http://schemas.microsoft.com/office/powerpoint/2010/main" val="3926860994"/>
+      </p:ext>
+    </p:extLst>
+  </p:cSld>
+  <p:clrMapOvr>
+    <a:masterClrMapping/>
+  </p:clrMapOvr>
+</p:notes>
+</file>
+
+<file path=ppt/notesSlides/notesSlide12.xml><?xml version="1.0" encoding="utf-8"?>
+<p:notes xmlns:a="http://schemas.openxmlformats.org/drawingml/2006/main" xmlns:r="http://schemas.openxmlformats.org/officeDocument/2006/relationships" xmlns:p="http://schemas.openxmlformats.org/presentationml/2006/main">
+  <p:cSld>
+    <p:spTree>
+      <p:nvGrpSpPr>
+        <p:cNvPr id="1" name=""/>
+        <p:cNvGrpSpPr/>
+        <p:nvPr/>
+      </p:nvGrpSpPr>
+      <p:grpSpPr>
+        <a:xfrm>
+          <a:off x="0" y="0"/>
+          <a:ext cx="0" cy="0"/>
+          <a:chOff x="0" y="0"/>
+          <a:chExt cx="0" cy="0"/>
+        </a:xfrm>
+      </p:grpSpPr>
+      <p:sp>
+        <p:nvSpPr>
+          <p:cNvPr id="2" name="Slide Image Placeholder 1"/>
+          <p:cNvSpPr>
+            <a:spLocks noGrp="1" noRot="1" noChangeAspect="1"/>
+          </p:cNvSpPr>
+          <p:nvPr>
+            <p:ph type="sldImg"/>
+          </p:nvPr>
+        </p:nvSpPr>
+        <p:spPr/>
+      </p:sp>
+      <p:sp>
+        <p:nvSpPr>
+          <p:cNvPr id="3" name="Notes Placeholder 2"/>
+          <p:cNvSpPr>
+            <a:spLocks noGrp="1"/>
+          </p:cNvSpPr>
+          <p:nvPr>
+            <p:ph type="body" idx="1"/>
+          </p:nvPr>
+        </p:nvSpPr>
+        <p:spPr/>
+        <p:txBody>
+          <a:bodyPr/>
+          <a:lstStyle/>
+          <a:p>
+            <a:pPr marL="0" marR="0" lvl="0" indent="0" algn="l" defTabSz="914400" rtl="0" eaLnBrk="1" fontAlgn="auto" latinLnBrk="0" hangingPunct="1">
+              <a:lnSpc>
+                <a:spcPct val="100000"/>
+              </a:lnSpc>
+              <a:spcBef>
+                <a:spcPts val="0"/>
+              </a:spcBef>
+              <a:spcAft>
+                <a:spcPts val="0"/>
+              </a:spcAft>
+              <a:buClrTx/>
+              <a:buSzTx/>
+              <a:buFontTx/>
+              <a:buNone/>
+              <a:tabLst/>
+              <a:defRPr/>
+            </a:pPr>
+            <a:r>
+              <a:rPr lang="en-US" dirty="0"/>
+              <a:t>With base&lt;derived&gt;::bar() being called, it gets compiled, but the compiler still chooses not to compile base&lt;derived&gt;::foo(), since it is not called in the program</a:t>
+            </a:r>
+          </a:p>
+        </p:txBody>
+      </p:sp>
+      <p:sp>
+        <p:nvSpPr>
+          <p:cNvPr id="4" name="Slide Number Placeholder 3"/>
+          <p:cNvSpPr>
+            <a:spLocks noGrp="1"/>
+          </p:cNvSpPr>
+          <p:nvPr>
+            <p:ph type="sldNum" sz="quarter" idx="10"/>
+          </p:nvPr>
+        </p:nvSpPr>
+        <p:spPr/>
+        <p:txBody>
+          <a:bodyPr/>
+          <a:lstStyle/>
+          <a:p>
+            <a:fld id="{07CFD0BC-341E-4884-8712-9D9DE84DAC90}" type="slidenum">
+              <a:rPr lang="en-US" smtClean="0"/>
+              <a:t>13</a:t>
+            </a:fld>
+            <a:endParaRPr lang="en-US"/>
+          </a:p>
+        </p:txBody>
+      </p:sp>
+    </p:spTree>
+    <p:extLst>
+      <p:ext uri="{BB962C8B-B14F-4D97-AF65-F5344CB8AC3E}">
+        <p14:creationId xmlns:p14="http://schemas.microsoft.com/office/powerpoint/2010/main" val="1399110548"/>
+      </p:ext>
+    </p:extLst>
+  </p:cSld>
+  <p:clrMapOvr>
+    <a:masterClrMapping/>
+  </p:clrMapOvr>
+</p:notes>
+</file>
+
+<file path=ppt/notesSlides/notesSlide13.xml><?xml version="1.0" encoding="utf-8"?>
+<p:notes xmlns:a="http://schemas.openxmlformats.org/drawingml/2006/main" xmlns:r="http://schemas.openxmlformats.org/officeDocument/2006/relationships" xmlns:p="http://schemas.openxmlformats.org/presentationml/2006/main">
+  <p:cSld>
+    <p:spTree>
+      <p:nvGrpSpPr>
+        <p:cNvPr id="1" name=""/>
+        <p:cNvGrpSpPr/>
+        <p:nvPr/>
+      </p:nvGrpSpPr>
+      <p:grpSpPr>
+        <a:xfrm>
+          <a:off x="0" y="0"/>
+          <a:ext cx="0" cy="0"/>
+          <a:chOff x="0" y="0"/>
+          <a:chExt cx="0" cy="0"/>
+        </a:xfrm>
+      </p:grpSpPr>
+      <p:sp>
+        <p:nvSpPr>
+          <p:cNvPr id="2" name="Slide Image Placeholder 1"/>
+          <p:cNvSpPr>
+            <a:spLocks noGrp="1" noRot="1" noChangeAspect="1"/>
+          </p:cNvSpPr>
+          <p:nvPr>
+            <p:ph type="sldImg"/>
+          </p:nvPr>
+        </p:nvSpPr>
+        <p:spPr/>
+      </p:sp>
+      <p:sp>
+        <p:nvSpPr>
+          <p:cNvPr id="3" name="Notes Placeholder 2"/>
+          <p:cNvSpPr>
+            <a:spLocks noGrp="1"/>
+          </p:cNvSpPr>
+          <p:nvPr>
+            <p:ph type="body" idx="1"/>
+          </p:nvPr>
+        </p:nvSpPr>
+        <p:spPr/>
+        <p:txBody>
+          <a:bodyPr/>
+          <a:lstStyle/>
+          <a:p>
             <a:pPr rtl="0"/>
-            <a:r>
-              <a:rPr lang="en-US" sz="1200" b="0" i="0" u="none" strike="noStrike" kern="1200" dirty="0">
-                <a:solidFill>
-                  <a:schemeClr val="tx1"/>
-                </a:solidFill>
-                <a:effectLst/>
-                <a:latin typeface="+mn-lt"/>
-                <a:ea typeface="+mn-ea"/>
-                <a:cs typeface="+mn-cs"/>
-              </a:rPr>
-              <a:t>Example pulled from “C++ Template Metaprogramming: Concepts, Tools, and Techniques from Boost and Beyond” chapter 9, section 8</a:t>
-            </a:r>
             <a:endParaRPr lang="en-US" dirty="0">
               <a:effectLst/>
             </a:endParaRPr>
           </a:p>
-          <a:p>
-            <a:pPr rtl="0"/>
-            <a:r>
-              <a:rPr lang="en-US" sz="1200" b="0" i="0" u="sng" strike="noStrike" kern="1200" dirty="0">
-                <a:solidFill>
-                  <a:schemeClr val="tx1"/>
-                </a:solidFill>
-                <a:effectLst/>
-                <a:latin typeface="+mn-lt"/>
-                <a:ea typeface="+mn-ea"/>
-                <a:cs typeface="+mn-cs"/>
-                <a:hlinkClick r:id="rId3"/>
-              </a:rPr>
-              <a:t>Aleksey </a:t>
-            </a:r>
-            <a:r>
-              <a:rPr lang="en-US" sz="1200" b="0" i="0" u="sng" strike="noStrike" kern="1200" dirty="0" err="1">
-                <a:solidFill>
-                  <a:schemeClr val="tx1"/>
-                </a:solidFill>
-                <a:effectLst/>
-                <a:latin typeface="+mn-lt"/>
-                <a:ea typeface="+mn-ea"/>
-                <a:cs typeface="+mn-cs"/>
-                <a:hlinkClick r:id="rId3"/>
-              </a:rPr>
-              <a:t>Gurtovoy</a:t>
-            </a:r>
-            <a:r>
-              <a:rPr lang="en-US" sz="1200" b="0" i="0" u="none" strike="noStrike" kern="1200" dirty="0">
-                <a:solidFill>
-                  <a:schemeClr val="tx1"/>
-                </a:solidFill>
-                <a:effectLst/>
-                <a:latin typeface="+mn-lt"/>
-                <a:ea typeface="+mn-ea"/>
-                <a:cs typeface="+mn-cs"/>
-              </a:rPr>
-              <a:t>,</a:t>
-            </a:r>
-            <a:r>
-              <a:rPr lang="en-US" sz="1200" b="0" i="0" u="none" strike="noStrike" kern="1200" dirty="0">
-                <a:solidFill>
-                  <a:schemeClr val="tx1"/>
-                </a:solidFill>
-                <a:effectLst/>
-                <a:latin typeface="+mn-lt"/>
-                <a:ea typeface="+mn-ea"/>
-                <a:cs typeface="+mn-cs"/>
-                <a:hlinkClick r:id="rId4"/>
-              </a:rPr>
-              <a:t> </a:t>
-            </a:r>
-            <a:r>
-              <a:rPr lang="en-US" sz="1200" b="0" i="0" u="sng" strike="noStrike" kern="1200" dirty="0">
-                <a:solidFill>
-                  <a:schemeClr val="tx1"/>
-                </a:solidFill>
-                <a:effectLst/>
-                <a:latin typeface="+mn-lt"/>
-                <a:ea typeface="+mn-ea"/>
-                <a:cs typeface="+mn-cs"/>
-                <a:hlinkClick r:id="rId4"/>
-              </a:rPr>
-              <a:t>David Abrahams</a:t>
-            </a:r>
-            <a:br>
-              <a:rPr lang="en-US" sz="1200" b="0" i="0" u="none" strike="noStrike" kern="1200" dirty="0">
-                <a:solidFill>
-                  <a:schemeClr val="tx1"/>
-                </a:solidFill>
-                <a:effectLst/>
-                <a:latin typeface="+mn-lt"/>
-                <a:ea typeface="+mn-ea"/>
-                <a:cs typeface="+mn-cs"/>
-                <a:hlinkClick r:id="rId4"/>
-              </a:rPr>
-            </a:br>
-            <a:r>
-              <a:rPr lang="en-US" sz="1200" b="0" i="0" u="none" strike="noStrike" kern="1200" dirty="0">
-                <a:solidFill>
-                  <a:schemeClr val="tx1"/>
-                </a:solidFill>
-                <a:effectLst/>
-                <a:latin typeface="+mn-lt"/>
-                <a:ea typeface="+mn-ea"/>
-                <a:cs typeface="+mn-cs"/>
-              </a:rPr>
-              <a:t>https://www.safaribooksonline.com/library/view/c-template-metaprogramming/0321227255/</a:t>
-            </a:r>
-            <a:endParaRPr lang="en-US" dirty="0">
-              <a:effectLst/>
-            </a:endParaRPr>
-          </a:p>
         </p:txBody>
       </p:sp>
       <p:sp>
@@ -924,7 +922,7 @@
           <a:p>
             <a:fld id="{07CFD0BC-341E-4884-8712-9D9DE84DAC90}" type="slidenum">
               <a:rPr lang="en-US" smtClean="0"/>
-              <a:t>12</a:t>
+              <a:t>14</a:t>
             </a:fld>
             <a:endParaRPr lang="en-US"/>
           </a:p>
@@ -1181,112 +1179,6 @@
           <a:lstStyle/>
           <a:p>
             <a:pPr rtl="0"/>
-            <a:r>
-              <a:rPr lang="en-US" sz="1200" b="0" i="0" u="none" strike="noStrike" kern="1200" dirty="0">
-                <a:solidFill>
-                  <a:schemeClr val="tx1"/>
-                </a:solidFill>
-                <a:effectLst/>
-                <a:latin typeface="+mn-lt"/>
-                <a:ea typeface="+mn-ea"/>
-                <a:cs typeface="+mn-cs"/>
-              </a:rPr>
-              <a:t>Example pulled from “C++ Template Metaprogramming: Concepts, Tools, and Techniques from Boost and Beyond” chapter 9, section 8</a:t>
-            </a:r>
-            <a:endParaRPr lang="en-US" dirty="0">
-              <a:effectLst/>
-            </a:endParaRPr>
-          </a:p>
-          <a:p>
-            <a:pPr rtl="0"/>
-            <a:r>
-              <a:rPr lang="en-US" sz="1200" b="0" i="0" u="sng" strike="noStrike" kern="1200" dirty="0">
-                <a:solidFill>
-                  <a:schemeClr val="tx1"/>
-                </a:solidFill>
-                <a:effectLst/>
-                <a:latin typeface="+mn-lt"/>
-                <a:ea typeface="+mn-ea"/>
-                <a:cs typeface="+mn-cs"/>
-                <a:hlinkClick r:id="rId3"/>
-              </a:rPr>
-              <a:t>Aleksey </a:t>
-            </a:r>
-            <a:r>
-              <a:rPr lang="en-US" sz="1200" b="0" i="0" u="sng" strike="noStrike" kern="1200" dirty="0" err="1">
-                <a:solidFill>
-                  <a:schemeClr val="tx1"/>
-                </a:solidFill>
-                <a:effectLst/>
-                <a:latin typeface="+mn-lt"/>
-                <a:ea typeface="+mn-ea"/>
-                <a:cs typeface="+mn-cs"/>
-                <a:hlinkClick r:id="rId3"/>
-              </a:rPr>
-              <a:t>Gurtovoy</a:t>
-            </a:r>
-            <a:r>
-              <a:rPr lang="en-US" sz="1200" b="0" i="0" u="none" strike="noStrike" kern="1200" dirty="0">
-                <a:solidFill>
-                  <a:schemeClr val="tx1"/>
-                </a:solidFill>
-                <a:effectLst/>
-                <a:latin typeface="+mn-lt"/>
-                <a:ea typeface="+mn-ea"/>
-                <a:cs typeface="+mn-cs"/>
-              </a:rPr>
-              <a:t>,</a:t>
-            </a:r>
-            <a:r>
-              <a:rPr lang="en-US" sz="1200" b="0" i="0" u="none" strike="noStrike" kern="1200" dirty="0">
-                <a:solidFill>
-                  <a:schemeClr val="tx1"/>
-                </a:solidFill>
-                <a:effectLst/>
-                <a:latin typeface="+mn-lt"/>
-                <a:ea typeface="+mn-ea"/>
-                <a:cs typeface="+mn-cs"/>
-                <a:hlinkClick r:id="rId4"/>
-              </a:rPr>
-              <a:t> </a:t>
-            </a:r>
-            <a:r>
-              <a:rPr lang="en-US" sz="1200" b="0" i="0" u="sng" strike="noStrike" kern="1200" dirty="0">
-                <a:solidFill>
-                  <a:schemeClr val="tx1"/>
-                </a:solidFill>
-                <a:effectLst/>
-                <a:latin typeface="+mn-lt"/>
-                <a:ea typeface="+mn-ea"/>
-                <a:cs typeface="+mn-cs"/>
-                <a:hlinkClick r:id="rId4"/>
-              </a:rPr>
-              <a:t>David Abrahams</a:t>
-            </a:r>
-            <a:br>
-              <a:rPr lang="en-US" sz="1200" b="0" i="0" u="none" strike="noStrike" kern="1200" dirty="0">
-                <a:solidFill>
-                  <a:schemeClr val="tx1"/>
-                </a:solidFill>
-                <a:effectLst/>
-                <a:latin typeface="+mn-lt"/>
-                <a:ea typeface="+mn-ea"/>
-                <a:cs typeface="+mn-cs"/>
-                <a:hlinkClick r:id="rId4"/>
-              </a:rPr>
-            </a:br>
-            <a:r>
-              <a:rPr lang="en-US" sz="1200" b="0" i="0" u="none" strike="noStrike" kern="1200" dirty="0">
-                <a:solidFill>
-                  <a:schemeClr val="tx1"/>
-                </a:solidFill>
-                <a:effectLst/>
-                <a:latin typeface="+mn-lt"/>
-                <a:ea typeface="+mn-ea"/>
-                <a:cs typeface="+mn-cs"/>
-              </a:rPr>
-              <a:t>https://www.safaribooksonline.com/library/view/c-template-metaprogramming/0321227255/</a:t>
-            </a:r>
             <a:endParaRPr lang="en-US" dirty="0">
               <a:effectLst/>
             </a:endParaRPr>
@@ -8199,7 +8091,7 @@
             </a:r>
             <a:r>
               <a:rPr lang="en-US" dirty="0"/>
-              <a:t> /*</a:t>
+              <a:t> []/*</a:t>
             </a:r>
             <a:r>
               <a:rPr lang="en-US" dirty="0" err="1"/>
@@ -8495,7 +8387,7 @@
             </a:pPr>
             <a:r>
               <a:rPr lang="en-US" dirty="0"/>
-              <a:t>To enforce concepts?</a:t>
+              <a:t>To enforce concepts</a:t>
             </a:r>
             <a:br>
               <a:rPr lang="en-US" dirty="0"/>
@@ -8531,13 +8423,8 @@
             </a:pPr>
             <a:r>
               <a:rPr lang="en-US" dirty="0"/>
-              <a:t>Performance improvement over virtual </a:t>
-            </a:r>
-            <a:r>
-              <a:rPr lang="en-US" dirty="0" err="1"/>
-              <a:t>methodss</a:t>
-            </a:r>
-            <a:endParaRPr lang="en-US" dirty="0"/>
+              <a:t>Performance improvement over virtual methods</a:t>
+            </a:r>
           </a:p>
         </p:txBody>
       </p:sp>
@@ -8590,6 +8477,593 @@
         <p:spPr/>
         <p:txBody>
           <a:bodyPr>
+            <a:normAutofit fontScale="90000"/>
+          </a:bodyPr>
+          <a:lstStyle/>
+          <a:p>
+            <a:r>
+              <a:rPr lang="en-US" dirty="0">
+                <a:effectLst/>
+              </a:rPr>
+              <a:t>CRTP – Why use it?</a:t>
+            </a:r>
+            <a:br>
+              <a:rPr lang="en-US" dirty="0">
+                <a:effectLst/>
+              </a:rPr>
+            </a:br>
+            <a:r>
+              <a:rPr lang="en-US" dirty="0">
+                <a:effectLst/>
+              </a:rPr>
+              <a:t>To enforce concepts</a:t>
+            </a:r>
+            <a:endParaRPr lang="en-US" dirty="0"/>
+          </a:p>
+        </p:txBody>
+      </p:sp>
+      <p:sp>
+        <p:nvSpPr>
+          <p:cNvPr id="3" name="Content Placeholder 2">
+            <a:extLst>
+              <a:ext uri="{FF2B5EF4-FFF2-40B4-BE49-F238E27FC236}">
+                <a16:creationId xmlns:a16="http://schemas.microsoft.com/office/drawing/2014/main" id="{5D065A81-9E6D-4C15-9E6B-62E02CCAC109}"/>
+              </a:ext>
+            </a:extLst>
+          </p:cNvPr>
+          <p:cNvSpPr>
+            <a:spLocks noGrp="1"/>
+          </p:cNvSpPr>
+          <p:nvPr>
+            <p:ph idx="1"/>
+          </p:nvPr>
+        </p:nvSpPr>
+        <p:spPr>
+          <a:xfrm>
+            <a:off x="385011" y="1732449"/>
+            <a:ext cx="11466094" cy="4800698"/>
+          </a:xfrm>
+        </p:spPr>
+        <p:txBody>
+          <a:bodyPr>
+            <a:normAutofit/>
+          </a:bodyPr>
+          <a:lstStyle/>
+          <a:p>
+            <a:pPr marL="0" indent="0">
+              <a:spcBef>
+                <a:spcPts val="0"/>
+              </a:spcBef>
+              <a:spcAft>
+                <a:spcPts val="0"/>
+              </a:spcAft>
+              <a:buNone/>
+            </a:pPr>
+            <a:r>
+              <a:rPr lang="en-US" dirty="0"/>
+              <a:t>//vehicle-</a:t>
+            </a:r>
+            <a:r>
+              <a:rPr lang="en-US" dirty="0" err="1"/>
+              <a:t>utilities.h</a:t>
+            </a:r>
+            <a:endParaRPr lang="en-US"/>
+          </a:p>
+          <a:p>
+            <a:pPr marL="0" indent="0">
+              <a:spcBef>
+                <a:spcPts val="0"/>
+              </a:spcBef>
+              <a:spcAft>
+                <a:spcPts val="0"/>
+              </a:spcAft>
+              <a:buNone/>
+            </a:pPr>
+            <a:r>
+              <a:rPr lang="en-US"/>
+              <a:t>namespace </a:t>
+            </a:r>
+            <a:r>
+              <a:rPr lang="en-US" dirty="0" err="1"/>
+              <a:t>our_stuff</a:t>
+            </a:r>
+            <a:r>
+              <a:rPr lang="en-US" dirty="0"/>
+              <a:t> {</a:t>
+            </a:r>
+          </a:p>
+          <a:p>
+            <a:pPr marL="0" indent="0">
+              <a:spcBef>
+                <a:spcPts val="0"/>
+              </a:spcBef>
+              <a:spcAft>
+                <a:spcPts val="0"/>
+              </a:spcAft>
+              <a:buNone/>
+            </a:pPr>
+            <a:r>
+              <a:rPr lang="en-US" dirty="0"/>
+              <a:t>template &lt;class Vehicle&gt;</a:t>
+            </a:r>
+          </a:p>
+          <a:p>
+            <a:pPr marL="0" indent="0">
+              <a:spcBef>
+                <a:spcPts val="0"/>
+              </a:spcBef>
+              <a:spcAft>
+                <a:spcPts val="0"/>
+              </a:spcAft>
+              <a:buNone/>
+            </a:pPr>
+            <a:r>
+              <a:rPr lang="en-US" dirty="0"/>
+              <a:t>void drive(Vehicle </a:t>
+            </a:r>
+            <a:r>
+              <a:rPr lang="en-US" dirty="0" err="1"/>
+              <a:t>const</a:t>
+            </a:r>
+            <a:r>
+              <a:rPr lang="en-US" dirty="0"/>
+              <a:t>&amp; v)</a:t>
+            </a:r>
+          </a:p>
+          <a:p>
+            <a:pPr marL="0" indent="0">
+              <a:spcBef>
+                <a:spcPts val="0"/>
+              </a:spcBef>
+              <a:spcAft>
+                <a:spcPts val="0"/>
+              </a:spcAft>
+              <a:buNone/>
+            </a:pPr>
+            <a:r>
+              <a:rPr lang="en-US" dirty="0"/>
+              <a:t>{ ... }</a:t>
+            </a:r>
+          </a:p>
+          <a:p>
+            <a:pPr marL="0" indent="0">
+              <a:spcBef>
+                <a:spcPts val="0"/>
+              </a:spcBef>
+              <a:spcAft>
+                <a:spcPts val="0"/>
+              </a:spcAft>
+              <a:buNone/>
+            </a:pPr>
+            <a:r>
+              <a:rPr lang="en-US" dirty="0"/>
+              <a:t>}/*end namespace </a:t>
+            </a:r>
+            <a:r>
+              <a:rPr lang="en-US" dirty="0" err="1"/>
+              <a:t>our_stuff</a:t>
+            </a:r>
+            <a:r>
+              <a:rPr lang="en-US" dirty="0"/>
+              <a:t>*/</a:t>
+            </a:r>
+          </a:p>
+        </p:txBody>
+      </p:sp>
+    </p:spTree>
+    <p:extLst>
+      <p:ext uri="{BB962C8B-B14F-4D97-AF65-F5344CB8AC3E}">
+        <p14:creationId xmlns:p14="http://schemas.microsoft.com/office/powerpoint/2010/main" val="185252416"/>
+      </p:ext>
+    </p:extLst>
+  </p:cSld>
+  <p:clrMapOvr>
+    <a:masterClrMapping/>
+  </p:clrMapOvr>
+</p:sld>
+</file>
+
+<file path=ppt/slides/slide13.xml><?xml version="1.0" encoding="utf-8"?>
+<p:sld xmlns:a="http://schemas.openxmlformats.org/drawingml/2006/main" xmlns:r="http://schemas.openxmlformats.org/officeDocument/2006/relationships" xmlns:p="http://schemas.openxmlformats.org/presentationml/2006/main">
+  <p:cSld>
+    <p:spTree>
+      <p:nvGrpSpPr>
+        <p:cNvPr id="1" name=""/>
+        <p:cNvGrpSpPr/>
+        <p:nvPr/>
+      </p:nvGrpSpPr>
+      <p:grpSpPr>
+        <a:xfrm>
+          <a:off x="0" y="0"/>
+          <a:ext cx="0" cy="0"/>
+          <a:chOff x="0" y="0"/>
+          <a:chExt cx="0" cy="0"/>
+        </a:xfrm>
+      </p:grpSpPr>
+      <p:sp>
+        <p:nvSpPr>
+          <p:cNvPr id="2" name="Title 1">
+            <a:extLst>
+              <a:ext uri="{FF2B5EF4-FFF2-40B4-BE49-F238E27FC236}">
+                <a16:creationId xmlns:a16="http://schemas.microsoft.com/office/drawing/2014/main" id="{560C5AC7-325E-4C6C-832B-6E869089B727}"/>
+              </a:ext>
+            </a:extLst>
+          </p:cNvPr>
+          <p:cNvSpPr>
+            <a:spLocks noGrp="1"/>
+          </p:cNvSpPr>
+          <p:nvPr>
+            <p:ph type="title"/>
+          </p:nvPr>
+        </p:nvSpPr>
+        <p:spPr/>
+        <p:txBody>
+          <a:bodyPr>
+            <a:normAutofit fontScale="90000"/>
+          </a:bodyPr>
+          <a:lstStyle/>
+          <a:p>
+            <a:r>
+              <a:rPr lang="en-US" dirty="0">
+                <a:effectLst/>
+              </a:rPr>
+              <a:t>CRTP – Why use it?</a:t>
+            </a:r>
+            <a:br>
+              <a:rPr lang="en-US" dirty="0">
+                <a:effectLst/>
+              </a:rPr>
+            </a:br>
+            <a:r>
+              <a:rPr lang="en-US" dirty="0">
+                <a:effectLst/>
+              </a:rPr>
+              <a:t>To enforce concepts</a:t>
+            </a:r>
+            <a:endParaRPr lang="en-US" dirty="0"/>
+          </a:p>
+        </p:txBody>
+      </p:sp>
+      <p:sp>
+        <p:nvSpPr>
+          <p:cNvPr id="3" name="Content Placeholder 2">
+            <a:extLst>
+              <a:ext uri="{FF2B5EF4-FFF2-40B4-BE49-F238E27FC236}">
+                <a16:creationId xmlns:a16="http://schemas.microsoft.com/office/drawing/2014/main" id="{5D065A81-9E6D-4C15-9E6B-62E02CCAC109}"/>
+              </a:ext>
+            </a:extLst>
+          </p:cNvPr>
+          <p:cNvSpPr>
+            <a:spLocks noGrp="1"/>
+          </p:cNvSpPr>
+          <p:nvPr>
+            <p:ph idx="1"/>
+          </p:nvPr>
+        </p:nvSpPr>
+        <p:spPr>
+          <a:xfrm>
+            <a:off x="385011" y="1732449"/>
+            <a:ext cx="11466094" cy="4800698"/>
+          </a:xfrm>
+        </p:spPr>
+        <p:txBody>
+          <a:bodyPr>
+            <a:normAutofit/>
+          </a:bodyPr>
+          <a:lstStyle/>
+          <a:p>
+            <a:pPr marL="0" indent="0">
+              <a:spcBef>
+                <a:spcPts val="0"/>
+              </a:spcBef>
+              <a:spcAft>
+                <a:spcPts val="0"/>
+              </a:spcAft>
+              <a:buNone/>
+            </a:pPr>
+            <a:r>
+              <a:rPr lang="en-US" dirty="0"/>
+              <a:t>//vehicle-</a:t>
+            </a:r>
+            <a:r>
+              <a:rPr lang="en-US" dirty="0" err="1"/>
+              <a:t>utilities.h</a:t>
+            </a:r>
+            <a:endParaRPr lang="en-US" dirty="0"/>
+          </a:p>
+          <a:p>
+            <a:pPr marL="0" indent="0">
+              <a:spcBef>
+                <a:spcPts val="0"/>
+              </a:spcBef>
+              <a:spcAft>
+                <a:spcPts val="0"/>
+              </a:spcAft>
+              <a:buNone/>
+            </a:pPr>
+            <a:r>
+              <a:rPr lang="en-US" dirty="0"/>
+              <a:t>namespace </a:t>
+            </a:r>
+            <a:r>
+              <a:rPr lang="en-US" dirty="0" err="1"/>
+              <a:t>our_stuff</a:t>
+            </a:r>
+            <a:r>
+              <a:rPr lang="en-US" dirty="0"/>
+              <a:t> {</a:t>
+            </a:r>
+          </a:p>
+          <a:p>
+            <a:pPr marL="0" indent="0">
+              <a:spcBef>
+                <a:spcPts val="0"/>
+              </a:spcBef>
+              <a:spcAft>
+                <a:spcPts val="0"/>
+              </a:spcAft>
+              <a:buNone/>
+            </a:pPr>
+            <a:r>
+              <a:rPr lang="en-US" dirty="0"/>
+              <a:t>template &lt;class Vehicle&gt;</a:t>
+            </a:r>
+          </a:p>
+          <a:p>
+            <a:pPr marL="0" indent="0">
+              <a:spcBef>
+                <a:spcPts val="0"/>
+              </a:spcBef>
+              <a:spcAft>
+                <a:spcPts val="0"/>
+              </a:spcAft>
+              <a:buNone/>
+            </a:pPr>
+            <a:r>
+              <a:rPr lang="en-US" dirty="0"/>
+              <a:t>void drive(Vehicle </a:t>
+            </a:r>
+            <a:r>
+              <a:rPr lang="en-US" dirty="0" err="1"/>
+              <a:t>const</a:t>
+            </a:r>
+            <a:r>
+              <a:rPr lang="en-US" dirty="0"/>
+              <a:t>&amp; v)</a:t>
+            </a:r>
+          </a:p>
+          <a:p>
+            <a:pPr marL="0" indent="0">
+              <a:spcBef>
+                <a:spcPts val="0"/>
+              </a:spcBef>
+              <a:spcAft>
+                <a:spcPts val="0"/>
+              </a:spcAft>
+              <a:buNone/>
+            </a:pPr>
+            <a:r>
+              <a:rPr lang="en-US" dirty="0"/>
+              <a:t>{ ... }</a:t>
+            </a:r>
+          </a:p>
+          <a:p>
+            <a:pPr marL="0" indent="0">
+              <a:spcBef>
+                <a:spcPts val="0"/>
+              </a:spcBef>
+              <a:spcAft>
+                <a:spcPts val="0"/>
+              </a:spcAft>
+              <a:buNone/>
+            </a:pPr>
+            <a:r>
+              <a:rPr lang="en-US" dirty="0"/>
+              <a:t>}/*end namespace </a:t>
+            </a:r>
+            <a:r>
+              <a:rPr lang="en-US" dirty="0" err="1"/>
+              <a:t>our_stuff</a:t>
+            </a:r>
+            <a:r>
+              <a:rPr lang="en-US" dirty="0"/>
+              <a:t>*/</a:t>
+            </a:r>
+          </a:p>
+          <a:p>
+            <a:pPr marL="0" indent="0">
+              <a:spcBef>
+                <a:spcPts val="0"/>
+              </a:spcBef>
+              <a:spcAft>
+                <a:spcPts val="0"/>
+              </a:spcAft>
+              <a:buNone/>
+            </a:pPr>
+            <a:endParaRPr lang="en-US" dirty="0"/>
+          </a:p>
+          <a:p>
+            <a:pPr marL="0" indent="0">
+              <a:spcBef>
+                <a:spcPts val="0"/>
+              </a:spcBef>
+              <a:spcAft>
+                <a:spcPts val="0"/>
+              </a:spcAft>
+              <a:buNone/>
+            </a:pPr>
+            <a:endParaRPr lang="en-US" dirty="0"/>
+          </a:p>
+          <a:p>
+            <a:pPr marL="0" indent="0">
+              <a:spcBef>
+                <a:spcPts val="0"/>
+              </a:spcBef>
+              <a:spcAft>
+                <a:spcPts val="0"/>
+              </a:spcAft>
+              <a:buNone/>
+            </a:pPr>
+            <a:r>
+              <a:rPr lang="en-US" dirty="0"/>
+              <a:t>//screw-</a:t>
+            </a:r>
+            <a:r>
+              <a:rPr lang="en-US" dirty="0" err="1"/>
+              <a:t>utilities.h</a:t>
+            </a:r>
+            <a:endParaRPr lang="en-US" dirty="0"/>
+          </a:p>
+          <a:p>
+            <a:pPr marL="0" indent="0">
+              <a:spcBef>
+                <a:spcPts val="0"/>
+              </a:spcBef>
+              <a:spcAft>
+                <a:spcPts val="0"/>
+              </a:spcAft>
+              <a:buNone/>
+            </a:pPr>
+            <a:r>
+              <a:rPr lang="en-US" dirty="0"/>
+              <a:t>namespace </a:t>
+            </a:r>
+            <a:r>
+              <a:rPr lang="en-US" dirty="0" err="1"/>
+              <a:t>our_stuff</a:t>
+            </a:r>
+            <a:r>
+              <a:rPr lang="en-US" dirty="0"/>
+              <a:t> {</a:t>
+            </a:r>
+          </a:p>
+          <a:p>
+            <a:pPr marL="0" indent="0">
+              <a:spcBef>
+                <a:spcPts val="0"/>
+              </a:spcBef>
+              <a:spcAft>
+                <a:spcPts val="0"/>
+              </a:spcAft>
+              <a:buNone/>
+            </a:pPr>
+            <a:r>
+              <a:rPr lang="en-US" dirty="0"/>
+              <a:t>template &lt;class Screw&gt;</a:t>
+            </a:r>
+          </a:p>
+          <a:p>
+            <a:pPr marL="0" indent="0">
+              <a:spcBef>
+                <a:spcPts val="0"/>
+              </a:spcBef>
+              <a:spcAft>
+                <a:spcPts val="0"/>
+              </a:spcAft>
+              <a:buNone/>
+            </a:pPr>
+            <a:r>
+              <a:rPr lang="en-US" dirty="0"/>
+              <a:t>void drive(Screw </a:t>
+            </a:r>
+            <a:r>
+              <a:rPr lang="en-US" dirty="0" err="1"/>
+              <a:t>const</a:t>
+            </a:r>
+            <a:r>
+              <a:rPr lang="en-US" dirty="0"/>
+              <a:t>&amp; s)</a:t>
+            </a:r>
+          </a:p>
+          <a:p>
+            <a:pPr marL="0" indent="0">
+              <a:spcBef>
+                <a:spcPts val="0"/>
+              </a:spcBef>
+              <a:spcAft>
+                <a:spcPts val="0"/>
+              </a:spcAft>
+              <a:buNone/>
+            </a:pPr>
+            <a:r>
+              <a:rPr lang="en-US" dirty="0"/>
+              <a:t>{ ... }</a:t>
+            </a:r>
+          </a:p>
+          <a:p>
+            <a:pPr marL="0" indent="0">
+              <a:spcBef>
+                <a:spcPts val="0"/>
+              </a:spcBef>
+              <a:spcAft>
+                <a:spcPts val="0"/>
+              </a:spcAft>
+              <a:buNone/>
+            </a:pPr>
+            <a:r>
+              <a:rPr lang="en-US" dirty="0"/>
+              <a:t>}/*end namespace </a:t>
+            </a:r>
+            <a:r>
+              <a:rPr lang="en-US" dirty="0" err="1"/>
+              <a:t>our_stuff</a:t>
+            </a:r>
+            <a:r>
+              <a:rPr lang="en-US" dirty="0"/>
+              <a:t>*/</a:t>
+            </a:r>
+          </a:p>
+        </p:txBody>
+      </p:sp>
+    </p:spTree>
+    <p:extLst>
+      <p:ext uri="{BB962C8B-B14F-4D97-AF65-F5344CB8AC3E}">
+        <p14:creationId xmlns:p14="http://schemas.microsoft.com/office/powerpoint/2010/main" val="1995730996"/>
+      </p:ext>
+    </p:extLst>
+  </p:cSld>
+  <p:clrMapOvr>
+    <a:masterClrMapping/>
+  </p:clrMapOvr>
+</p:sld>
+</file>
+
+<file path=ppt/slides/slide14.xml><?xml version="1.0" encoding="utf-8"?>
+<p:sld xmlns:a="http://schemas.openxmlformats.org/drawingml/2006/main" xmlns:r="http://schemas.openxmlformats.org/officeDocument/2006/relationships" xmlns:p="http://schemas.openxmlformats.org/presentationml/2006/main">
+  <p:cSld>
+    <p:spTree>
+      <p:nvGrpSpPr>
+        <p:cNvPr id="1" name=""/>
+        <p:cNvGrpSpPr/>
+        <p:nvPr/>
+      </p:nvGrpSpPr>
+      <p:grpSpPr>
+        <a:xfrm>
+          <a:off x="0" y="0"/>
+          <a:ext cx="0" cy="0"/>
+          <a:chOff x="0" y="0"/>
+          <a:chExt cx="0" cy="0"/>
+        </a:xfrm>
+      </p:grpSpPr>
+      <p:sp>
+        <p:nvSpPr>
+          <p:cNvPr id="2" name="Title 1">
+            <a:extLst>
+              <a:ext uri="{FF2B5EF4-FFF2-40B4-BE49-F238E27FC236}">
+                <a16:creationId xmlns:a16="http://schemas.microsoft.com/office/drawing/2014/main" id="{560C5AC7-325E-4C6C-832B-6E869089B727}"/>
+              </a:ext>
+            </a:extLst>
+          </p:cNvPr>
+          <p:cNvSpPr>
+            <a:spLocks noGrp="1"/>
+          </p:cNvSpPr>
+          <p:nvPr>
+            <p:ph type="title"/>
+          </p:nvPr>
+        </p:nvSpPr>
+        <p:spPr/>
+        <p:txBody>
+          <a:bodyPr>
             <a:normAutofit/>
           </a:bodyPr>
           <a:lstStyle/>
@@ -9966,7 +10440,7 @@
             </a:r>
             <a:r>
               <a:rPr lang="en-US" dirty="0"/>
-              <a:t> /*</a:t>
+              <a:t> []/*</a:t>
             </a:r>
             <a:r>
               <a:rPr lang="en-US" dirty="0" err="1"/>

</xml_diff>

<commit_message>
Adding CRTP Singleton example
</commit_message>
<xml_diff>
--- a/CRTP.pptx
+++ b/CRTP.pptx
@@ -5,7 +5,7 @@
     <p:sldMasterId id="2147483804" r:id="rId1"/>
   </p:sldMasterIdLst>
   <p:notesMasterIdLst>
-    <p:notesMasterId r:id="rId18"/>
+    <p:notesMasterId r:id="rId20"/>
   </p:notesMasterIdLst>
   <p:sldIdLst>
     <p:sldId id="256" r:id="rId2"/>
@@ -23,7 +23,9 @@
     <p:sldId id="279" r:id="rId14"/>
     <p:sldId id="280" r:id="rId15"/>
     <p:sldId id="271" r:id="rId16"/>
-    <p:sldId id="278" r:id="rId17"/>
+    <p:sldId id="281" r:id="rId17"/>
+    <p:sldId id="282" r:id="rId18"/>
+    <p:sldId id="278" r:id="rId19"/>
   </p:sldIdLst>
   <p:sldSz cx="12192000" cy="6858000"/>
   <p:notesSz cx="6858000" cy="9144000"/>
@@ -1081,6 +1083,194 @@
             <a:fld id="{07CFD0BC-341E-4884-8712-9D9DE84DAC90}" type="slidenum">
               <a:rPr lang="en-US" smtClean="0"/>
               <a:t>16</a:t>
+            </a:fld>
+            <a:endParaRPr lang="en-US"/>
+          </a:p>
+        </p:txBody>
+      </p:sp>
+    </p:spTree>
+    <p:extLst>
+      <p:ext uri="{BB962C8B-B14F-4D97-AF65-F5344CB8AC3E}">
+        <p14:creationId xmlns:p14="http://schemas.microsoft.com/office/powerpoint/2010/main" val="2276481020"/>
+      </p:ext>
+    </p:extLst>
+  </p:cSld>
+  <p:clrMapOvr>
+    <a:masterClrMapping/>
+  </p:clrMapOvr>
+</p:notes>
+</file>
+
+<file path=ppt/notesSlides/notesSlide16.xml><?xml version="1.0" encoding="utf-8"?>
+<p:notes xmlns:a="http://schemas.openxmlformats.org/drawingml/2006/main" xmlns:r="http://schemas.openxmlformats.org/officeDocument/2006/relationships" xmlns:p="http://schemas.openxmlformats.org/presentationml/2006/main">
+  <p:cSld>
+    <p:spTree>
+      <p:nvGrpSpPr>
+        <p:cNvPr id="1" name=""/>
+        <p:cNvGrpSpPr/>
+        <p:nvPr/>
+      </p:nvGrpSpPr>
+      <p:grpSpPr>
+        <a:xfrm>
+          <a:off x="0" y="0"/>
+          <a:ext cx="0" cy="0"/>
+          <a:chOff x="0" y="0"/>
+          <a:chExt cx="0" cy="0"/>
+        </a:xfrm>
+      </p:grpSpPr>
+      <p:sp>
+        <p:nvSpPr>
+          <p:cNvPr id="2" name="Slide Image Placeholder 1"/>
+          <p:cNvSpPr>
+            <a:spLocks noGrp="1" noRot="1" noChangeAspect="1"/>
+          </p:cNvSpPr>
+          <p:nvPr>
+            <p:ph type="sldImg"/>
+          </p:nvPr>
+        </p:nvSpPr>
+        <p:spPr/>
+      </p:sp>
+      <p:sp>
+        <p:nvSpPr>
+          <p:cNvPr id="3" name="Notes Placeholder 2"/>
+          <p:cNvSpPr>
+            <a:spLocks noGrp="1"/>
+          </p:cNvSpPr>
+          <p:nvPr>
+            <p:ph type="body" idx="1"/>
+          </p:nvPr>
+        </p:nvSpPr>
+        <p:spPr/>
+        <p:txBody>
+          <a:bodyPr/>
+          <a:lstStyle/>
+          <a:p>
+            <a:pPr marL="0" marR="0" lvl="0" indent="0" algn="l" defTabSz="914400" rtl="0" eaLnBrk="1" fontAlgn="auto" latinLnBrk="0" hangingPunct="1">
+              <a:lnSpc>
+                <a:spcPct val="100000"/>
+              </a:lnSpc>
+              <a:spcBef>
+                <a:spcPts val="0"/>
+              </a:spcBef>
+              <a:spcAft>
+                <a:spcPts val="0"/>
+              </a:spcAft>
+              <a:buClrTx/>
+              <a:buSzTx/>
+              <a:buFontTx/>
+              <a:buNone/>
+              <a:tabLst/>
+              <a:defRPr/>
+            </a:pPr>
+            <a:endParaRPr lang="en-US" dirty="0"/>
+          </a:p>
+        </p:txBody>
+      </p:sp>
+      <p:sp>
+        <p:nvSpPr>
+          <p:cNvPr id="4" name="Slide Number Placeholder 3"/>
+          <p:cNvSpPr>
+            <a:spLocks noGrp="1"/>
+          </p:cNvSpPr>
+          <p:nvPr>
+            <p:ph type="sldNum" sz="quarter" idx="10"/>
+          </p:nvPr>
+        </p:nvSpPr>
+        <p:spPr/>
+        <p:txBody>
+          <a:bodyPr/>
+          <a:lstStyle/>
+          <a:p>
+            <a:fld id="{07CFD0BC-341E-4884-8712-9D9DE84DAC90}" type="slidenum">
+              <a:rPr lang="en-US" smtClean="0"/>
+              <a:t>17</a:t>
+            </a:fld>
+            <a:endParaRPr lang="en-US"/>
+          </a:p>
+        </p:txBody>
+      </p:sp>
+    </p:spTree>
+    <p:extLst>
+      <p:ext uri="{BB962C8B-B14F-4D97-AF65-F5344CB8AC3E}">
+        <p14:creationId xmlns:p14="http://schemas.microsoft.com/office/powerpoint/2010/main" val="2734553923"/>
+      </p:ext>
+    </p:extLst>
+  </p:cSld>
+  <p:clrMapOvr>
+    <a:masterClrMapping/>
+  </p:clrMapOvr>
+</p:notes>
+</file>
+
+<file path=ppt/notesSlides/notesSlide17.xml><?xml version="1.0" encoding="utf-8"?>
+<p:notes xmlns:a="http://schemas.openxmlformats.org/drawingml/2006/main" xmlns:r="http://schemas.openxmlformats.org/officeDocument/2006/relationships" xmlns:p="http://schemas.openxmlformats.org/presentationml/2006/main">
+  <p:cSld>
+    <p:spTree>
+      <p:nvGrpSpPr>
+        <p:cNvPr id="1" name=""/>
+        <p:cNvGrpSpPr/>
+        <p:nvPr/>
+      </p:nvGrpSpPr>
+      <p:grpSpPr>
+        <a:xfrm>
+          <a:off x="0" y="0"/>
+          <a:ext cx="0" cy="0"/>
+          <a:chOff x="0" y="0"/>
+          <a:chExt cx="0" cy="0"/>
+        </a:xfrm>
+      </p:grpSpPr>
+      <p:sp>
+        <p:nvSpPr>
+          <p:cNvPr id="2" name="Slide Image Placeholder 1"/>
+          <p:cNvSpPr>
+            <a:spLocks noGrp="1" noRot="1" noChangeAspect="1"/>
+          </p:cNvSpPr>
+          <p:nvPr>
+            <p:ph type="sldImg"/>
+          </p:nvPr>
+        </p:nvSpPr>
+        <p:spPr/>
+      </p:sp>
+      <p:sp>
+        <p:nvSpPr>
+          <p:cNvPr id="3" name="Notes Placeholder 2"/>
+          <p:cNvSpPr>
+            <a:spLocks noGrp="1"/>
+          </p:cNvSpPr>
+          <p:nvPr>
+            <p:ph type="body" idx="1"/>
+          </p:nvPr>
+        </p:nvSpPr>
+        <p:spPr/>
+        <p:txBody>
+          <a:bodyPr/>
+          <a:lstStyle/>
+          <a:p>
+            <a:pPr rtl="0"/>
+            <a:endParaRPr lang="en-US" dirty="0">
+              <a:effectLst/>
+            </a:endParaRPr>
+          </a:p>
+        </p:txBody>
+      </p:sp>
+      <p:sp>
+        <p:nvSpPr>
+          <p:cNvPr id="4" name="Slide Number Placeholder 3"/>
+          <p:cNvSpPr>
+            <a:spLocks noGrp="1"/>
+          </p:cNvSpPr>
+          <p:nvPr>
+            <p:ph type="sldNum" sz="quarter" idx="10"/>
+          </p:nvPr>
+        </p:nvSpPr>
+        <p:spPr/>
+        <p:txBody>
+          <a:bodyPr/>
+          <a:lstStyle/>
+          <a:p>
+            <a:fld id="{07CFD0BC-341E-4884-8712-9D9DE84DAC90}" type="slidenum">
+              <a:rPr lang="en-US" smtClean="0"/>
+              <a:t>18</a:t>
             </a:fld>
             <a:endParaRPr lang="en-US"/>
           </a:p>
@@ -8574,7 +8764,7 @@
             </a:pPr>
             <a:r>
               <a:rPr lang="en-US" dirty="0"/>
-              <a:t>Class extension or code re-use</a:t>
+              <a:t>Class extension</a:t>
             </a:r>
             <a:br>
               <a:rPr lang="en-US" dirty="0"/>
@@ -11878,6 +12068,674 @@
               </a:rPr>
               <a:t>Maybe not… Value semantics + slicing or reference semantics; pick one</a:t>
             </a:r>
+            <a:endParaRPr lang="en-US" dirty="0"/>
+          </a:p>
+          <a:p>
+            <a:pPr indent="-342900">
+              <a:spcBef>
+                <a:spcPts val="0"/>
+              </a:spcBef>
+              <a:spcAft>
+                <a:spcPts val="0"/>
+              </a:spcAft>
+            </a:pPr>
+            <a:r>
+              <a:rPr lang="en-US" dirty="0"/>
+              <a:t>Class extension or code re-use</a:t>
+            </a:r>
+            <a:endParaRPr lang="en-US" dirty="0">
+              <a:effectLst/>
+            </a:endParaRPr>
+          </a:p>
+        </p:txBody>
+      </p:sp>
+    </p:spTree>
+    <p:extLst>
+      <p:ext uri="{BB962C8B-B14F-4D97-AF65-F5344CB8AC3E}">
+        <p14:creationId xmlns:p14="http://schemas.microsoft.com/office/powerpoint/2010/main" val="114254548"/>
+      </p:ext>
+    </p:extLst>
+  </p:cSld>
+  <p:clrMapOvr>
+    <a:masterClrMapping/>
+  </p:clrMapOvr>
+</p:sld>
+</file>
+
+<file path=ppt/slides/slide17.xml><?xml version="1.0" encoding="utf-8"?>
+<p:sld xmlns:a="http://schemas.openxmlformats.org/drawingml/2006/main" xmlns:r="http://schemas.openxmlformats.org/officeDocument/2006/relationships" xmlns:p="http://schemas.openxmlformats.org/presentationml/2006/main">
+  <p:cSld>
+    <p:spTree>
+      <p:nvGrpSpPr>
+        <p:cNvPr id="1" name=""/>
+        <p:cNvGrpSpPr/>
+        <p:nvPr/>
+      </p:nvGrpSpPr>
+      <p:grpSpPr>
+        <a:xfrm>
+          <a:off x="0" y="0"/>
+          <a:ext cx="0" cy="0"/>
+          <a:chOff x="0" y="0"/>
+          <a:chExt cx="0" cy="0"/>
+        </a:xfrm>
+      </p:grpSpPr>
+      <p:sp>
+        <p:nvSpPr>
+          <p:cNvPr id="2" name="Title 1">
+            <a:extLst>
+              <a:ext uri="{FF2B5EF4-FFF2-40B4-BE49-F238E27FC236}">
+                <a16:creationId xmlns:a16="http://schemas.microsoft.com/office/drawing/2014/main" id="{560C5AC7-325E-4C6C-832B-6E869089B727}"/>
+              </a:ext>
+            </a:extLst>
+          </p:cNvPr>
+          <p:cNvSpPr>
+            <a:spLocks noGrp="1"/>
+          </p:cNvSpPr>
+          <p:nvPr>
+            <p:ph type="title"/>
+          </p:nvPr>
+        </p:nvSpPr>
+        <p:spPr/>
+        <p:txBody>
+          <a:bodyPr>
+            <a:normAutofit fontScale="90000"/>
+          </a:bodyPr>
+          <a:lstStyle/>
+          <a:p>
+            <a:r>
+              <a:rPr lang="en-US" dirty="0">
+                <a:effectLst/>
+              </a:rPr>
+              <a:t>CRTP – Why use it?</a:t>
+            </a:r>
+            <a:br>
+              <a:rPr lang="en-US" dirty="0">
+                <a:effectLst/>
+              </a:rPr>
+            </a:br>
+            <a:r>
+              <a:rPr lang="en-US" dirty="0"/>
+              <a:t>Class extension: singleton</a:t>
+            </a:r>
+          </a:p>
+        </p:txBody>
+      </p:sp>
+      <p:sp>
+        <p:nvSpPr>
+          <p:cNvPr id="3" name="Content Placeholder 2">
+            <a:extLst>
+              <a:ext uri="{FF2B5EF4-FFF2-40B4-BE49-F238E27FC236}">
+                <a16:creationId xmlns:a16="http://schemas.microsoft.com/office/drawing/2014/main" id="{5D065A81-9E6D-4C15-9E6B-62E02CCAC109}"/>
+              </a:ext>
+            </a:extLst>
+          </p:cNvPr>
+          <p:cNvSpPr>
+            <a:spLocks noGrp="1"/>
+          </p:cNvSpPr>
+          <p:nvPr>
+            <p:ph idx="1"/>
+          </p:nvPr>
+        </p:nvSpPr>
+        <p:spPr>
+          <a:xfrm>
+            <a:off x="385011" y="1732449"/>
+            <a:ext cx="11466094" cy="4800698"/>
+          </a:xfrm>
+        </p:spPr>
+        <p:txBody>
+          <a:bodyPr>
+            <a:normAutofit fontScale="92500" lnSpcReduction="10000"/>
+          </a:bodyPr>
+          <a:lstStyle/>
+          <a:p>
+            <a:pPr marL="0" indent="0">
+              <a:spcBef>
+                <a:spcPts val="0"/>
+              </a:spcBef>
+              <a:spcAft>
+                <a:spcPts val="0"/>
+              </a:spcAft>
+              <a:buNone/>
+            </a:pPr>
+            <a:r>
+              <a:rPr lang="en-US" dirty="0"/>
+              <a:t>template&lt;</a:t>
+            </a:r>
+            <a:r>
+              <a:rPr lang="en-US" b="1" dirty="0" err="1"/>
+              <a:t>typename</a:t>
+            </a:r>
+            <a:r>
+              <a:rPr lang="en-US" b="1" dirty="0"/>
+              <a:t> derived</a:t>
+            </a:r>
+            <a:r>
+              <a:rPr lang="en-US" dirty="0"/>
+              <a:t>&gt;</a:t>
+            </a:r>
+          </a:p>
+          <a:p>
+            <a:pPr marL="0" indent="0">
+              <a:spcBef>
+                <a:spcPts val="0"/>
+              </a:spcBef>
+              <a:spcAft>
+                <a:spcPts val="0"/>
+              </a:spcAft>
+              <a:buNone/>
+            </a:pPr>
+            <a:r>
+              <a:rPr lang="en-US" dirty="0"/>
+              <a:t>class singleton</a:t>
+            </a:r>
+          </a:p>
+          <a:p>
+            <a:pPr marL="0" indent="0">
+              <a:spcBef>
+                <a:spcPts val="0"/>
+              </a:spcBef>
+              <a:spcAft>
+                <a:spcPts val="0"/>
+              </a:spcAft>
+              <a:buNone/>
+            </a:pPr>
+            <a:r>
+              <a:rPr lang="en-US" dirty="0"/>
+              <a:t>{</a:t>
+            </a:r>
+          </a:p>
+          <a:p>
+            <a:pPr marL="0" indent="0">
+              <a:spcBef>
+                <a:spcPts val="0"/>
+              </a:spcBef>
+              <a:spcAft>
+                <a:spcPts val="0"/>
+              </a:spcAft>
+              <a:buNone/>
+            </a:pPr>
+            <a:r>
+              <a:rPr lang="en-US" dirty="0"/>
+              <a:t>  singleton(</a:t>
+            </a:r>
+            <a:r>
+              <a:rPr lang="en-US" dirty="0" err="1"/>
+              <a:t>const</a:t>
+            </a:r>
+            <a:r>
+              <a:rPr lang="en-US" dirty="0"/>
+              <a:t> singleton&amp;) </a:t>
+            </a:r>
+            <a:r>
+              <a:rPr lang="en-US" b="1" dirty="0"/>
+              <a:t>= delete</a:t>
+            </a:r>
+            <a:r>
+              <a:rPr lang="en-US" dirty="0"/>
+              <a:t>;</a:t>
+            </a:r>
+          </a:p>
+          <a:p>
+            <a:pPr marL="0" indent="0">
+              <a:spcBef>
+                <a:spcPts val="0"/>
+              </a:spcBef>
+              <a:spcAft>
+                <a:spcPts val="0"/>
+              </a:spcAft>
+              <a:buNone/>
+            </a:pPr>
+            <a:r>
+              <a:rPr lang="en-US" dirty="0"/>
+              <a:t>  auto operator=(</a:t>
+            </a:r>
+            <a:r>
+              <a:rPr lang="en-US" dirty="0" err="1"/>
+              <a:t>const</a:t>
+            </a:r>
+            <a:r>
+              <a:rPr lang="en-US" dirty="0"/>
+              <a:t> singleton&amp;) -&gt; singleton&amp; </a:t>
+            </a:r>
+            <a:r>
+              <a:rPr lang="en-US" b="1" dirty="0"/>
+              <a:t>= delete</a:t>
+            </a:r>
+            <a:r>
+              <a:rPr lang="en-US" dirty="0"/>
+              <a:t>;</a:t>
+            </a:r>
+          </a:p>
+          <a:p>
+            <a:pPr marL="0" indent="0">
+              <a:spcBef>
+                <a:spcPts val="0"/>
+              </a:spcBef>
+              <a:spcAft>
+                <a:spcPts val="0"/>
+              </a:spcAft>
+              <a:buNone/>
+            </a:pPr>
+            <a:r>
+              <a:rPr lang="en-US" dirty="0"/>
+              <a:t>protected:</a:t>
+            </a:r>
+          </a:p>
+          <a:p>
+            <a:pPr marL="0" indent="0">
+              <a:spcBef>
+                <a:spcPts val="0"/>
+              </a:spcBef>
+              <a:spcAft>
+                <a:spcPts val="0"/>
+              </a:spcAft>
+              <a:buNone/>
+            </a:pPr>
+            <a:r>
+              <a:rPr lang="en-US" dirty="0"/>
+              <a:t>  </a:t>
+            </a:r>
+            <a:r>
+              <a:rPr lang="en-US" b="1" dirty="0"/>
+              <a:t>static </a:t>
+            </a:r>
+            <a:r>
+              <a:rPr lang="en-US" b="1" dirty="0" err="1"/>
+              <a:t>std</a:t>
+            </a:r>
+            <a:r>
+              <a:rPr lang="en-US" b="1" dirty="0"/>
+              <a:t>::</a:t>
+            </a:r>
+            <a:r>
+              <a:rPr lang="en-US" b="1" dirty="0" err="1"/>
+              <a:t>unique_ptr</a:t>
+            </a:r>
+            <a:r>
+              <a:rPr lang="en-US" b="1" dirty="0"/>
+              <a:t>&lt;derived&gt; </a:t>
+            </a:r>
+            <a:r>
+              <a:rPr lang="en-US" b="1" dirty="0" err="1"/>
+              <a:t>obj</a:t>
+            </a:r>
+            <a:r>
+              <a:rPr lang="en-US" dirty="0"/>
+              <a:t>;</a:t>
+            </a:r>
+          </a:p>
+          <a:p>
+            <a:pPr marL="0" indent="0">
+              <a:spcBef>
+                <a:spcPts val="0"/>
+              </a:spcBef>
+              <a:spcAft>
+                <a:spcPts val="0"/>
+              </a:spcAft>
+              <a:buNone/>
+            </a:pPr>
+            <a:r>
+              <a:rPr lang="en-US" dirty="0"/>
+              <a:t>  singleton() = default;</a:t>
+            </a:r>
+          </a:p>
+          <a:p>
+            <a:pPr marL="0" indent="0">
+              <a:spcBef>
+                <a:spcPts val="0"/>
+              </a:spcBef>
+              <a:spcAft>
+                <a:spcPts val="0"/>
+              </a:spcAft>
+              <a:buNone/>
+            </a:pPr>
+            <a:r>
+              <a:rPr lang="en-US" dirty="0"/>
+              <a:t>public:</a:t>
+            </a:r>
+          </a:p>
+          <a:p>
+            <a:pPr marL="0" indent="0">
+              <a:spcBef>
+                <a:spcPts val="0"/>
+              </a:spcBef>
+              <a:spcAft>
+                <a:spcPts val="0"/>
+              </a:spcAft>
+              <a:buNone/>
+            </a:pPr>
+            <a:r>
+              <a:rPr lang="en-US" dirty="0"/>
+              <a:t>  </a:t>
+            </a:r>
+            <a:r>
+              <a:rPr lang="en-US" b="1" dirty="0"/>
+              <a:t>static auto get() -&gt; derived&amp; </a:t>
+            </a:r>
+            <a:r>
+              <a:rPr lang="en-US" dirty="0"/>
+              <a:t>{</a:t>
+            </a:r>
+          </a:p>
+          <a:p>
+            <a:pPr marL="0" indent="0">
+              <a:spcBef>
+                <a:spcPts val="0"/>
+              </a:spcBef>
+              <a:spcAft>
+                <a:spcPts val="0"/>
+              </a:spcAft>
+              <a:buNone/>
+            </a:pPr>
+            <a:r>
+              <a:rPr lang="en-US" dirty="0"/>
+              <a:t>    if(!</a:t>
+            </a:r>
+            <a:r>
+              <a:rPr lang="en-US" dirty="0" err="1"/>
+              <a:t>obj</a:t>
+            </a:r>
+            <a:r>
+              <a:rPr lang="en-US" dirty="0"/>
+              <a:t>) {</a:t>
+            </a:r>
+          </a:p>
+          <a:p>
+            <a:pPr marL="0" indent="0">
+              <a:spcBef>
+                <a:spcPts val="0"/>
+              </a:spcBef>
+              <a:spcAft>
+                <a:spcPts val="0"/>
+              </a:spcAft>
+              <a:buNone/>
+            </a:pPr>
+            <a:r>
+              <a:rPr lang="en-US" dirty="0"/>
+              <a:t>      </a:t>
+            </a:r>
+            <a:r>
+              <a:rPr lang="en-US" b="1" dirty="0" err="1"/>
+              <a:t>obj</a:t>
+            </a:r>
+            <a:r>
+              <a:rPr lang="en-US" b="1" dirty="0"/>
+              <a:t> = </a:t>
+            </a:r>
+            <a:r>
+              <a:rPr lang="en-US" b="1" dirty="0" err="1"/>
+              <a:t>std</a:t>
+            </a:r>
+            <a:r>
+              <a:rPr lang="en-US" b="1" dirty="0"/>
+              <a:t>::</a:t>
+            </a:r>
+            <a:r>
+              <a:rPr lang="en-US" b="1" dirty="0" err="1"/>
+              <a:t>unique_ptr</a:t>
+            </a:r>
+            <a:r>
+              <a:rPr lang="en-US" b="1" dirty="0"/>
+              <a:t>&lt;derived&gt;(new derived{});</a:t>
+            </a:r>
+          </a:p>
+          <a:p>
+            <a:pPr marL="0" indent="0">
+              <a:spcBef>
+                <a:spcPts val="0"/>
+              </a:spcBef>
+              <a:spcAft>
+                <a:spcPts val="0"/>
+              </a:spcAft>
+              <a:buNone/>
+            </a:pPr>
+            <a:r>
+              <a:rPr lang="en-US" dirty="0"/>
+              <a:t>    }</a:t>
+            </a:r>
+          </a:p>
+          <a:p>
+            <a:pPr marL="0" indent="0">
+              <a:spcBef>
+                <a:spcPts val="0"/>
+              </a:spcBef>
+              <a:spcAft>
+                <a:spcPts val="0"/>
+              </a:spcAft>
+              <a:buNone/>
+            </a:pPr>
+            <a:r>
+              <a:rPr lang="en-US" dirty="0"/>
+              <a:t>    return *</a:t>
+            </a:r>
+            <a:r>
+              <a:rPr lang="en-US" dirty="0" err="1"/>
+              <a:t>obj</a:t>
+            </a:r>
+            <a:r>
+              <a:rPr lang="en-US" dirty="0"/>
+              <a:t>;</a:t>
+            </a:r>
+          </a:p>
+          <a:p>
+            <a:pPr marL="0" indent="0">
+              <a:spcBef>
+                <a:spcPts val="0"/>
+              </a:spcBef>
+              <a:spcAft>
+                <a:spcPts val="0"/>
+              </a:spcAft>
+              <a:buNone/>
+            </a:pPr>
+            <a:r>
+              <a:rPr lang="en-US" dirty="0"/>
+              <a:t>  }</a:t>
+            </a:r>
+          </a:p>
+          <a:p>
+            <a:pPr marL="0" indent="0">
+              <a:spcBef>
+                <a:spcPts val="0"/>
+              </a:spcBef>
+              <a:spcAft>
+                <a:spcPts val="0"/>
+              </a:spcAft>
+              <a:buNone/>
+            </a:pPr>
+            <a:r>
+              <a:rPr lang="en-US" dirty="0"/>
+              <a:t>};</a:t>
+            </a:r>
+          </a:p>
+          <a:p>
+            <a:pPr marL="0" indent="0">
+              <a:spcBef>
+                <a:spcPts val="0"/>
+              </a:spcBef>
+              <a:spcAft>
+                <a:spcPts val="0"/>
+              </a:spcAft>
+              <a:buNone/>
+            </a:pPr>
+            <a:r>
+              <a:rPr lang="en-US" dirty="0"/>
+              <a:t>template&lt;</a:t>
+            </a:r>
+            <a:r>
+              <a:rPr lang="en-US" dirty="0" err="1"/>
+              <a:t>typename</a:t>
+            </a:r>
+            <a:r>
+              <a:rPr lang="en-US" dirty="0"/>
+              <a:t> derived&gt;</a:t>
+            </a:r>
+          </a:p>
+          <a:p>
+            <a:pPr marL="0" indent="0">
+              <a:spcBef>
+                <a:spcPts val="0"/>
+              </a:spcBef>
+              <a:spcAft>
+                <a:spcPts val="0"/>
+              </a:spcAft>
+              <a:buNone/>
+            </a:pPr>
+            <a:r>
+              <a:rPr lang="en-US" dirty="0" err="1"/>
+              <a:t>std</a:t>
+            </a:r>
+            <a:r>
+              <a:rPr lang="en-US" dirty="0"/>
+              <a:t>::</a:t>
+            </a:r>
+            <a:r>
+              <a:rPr lang="en-US" dirty="0" err="1"/>
+              <a:t>unique_ptr</a:t>
+            </a:r>
+            <a:r>
+              <a:rPr lang="en-US" dirty="0"/>
+              <a:t>&lt;derived&gt; singleton&lt;derived&gt;::</a:t>
+            </a:r>
+            <a:r>
+              <a:rPr lang="en-US" dirty="0" err="1"/>
+              <a:t>obj</a:t>
+            </a:r>
+            <a:r>
+              <a:rPr lang="en-US" dirty="0"/>
+              <a:t> = </a:t>
+            </a:r>
+            <a:r>
+              <a:rPr lang="en-US" dirty="0" err="1"/>
+              <a:t>nullptr</a:t>
+            </a:r>
+            <a:r>
+              <a:rPr lang="en-US" dirty="0"/>
+              <a:t>;</a:t>
+            </a:r>
+          </a:p>
+        </p:txBody>
+      </p:sp>
+    </p:spTree>
+    <p:extLst>
+      <p:ext uri="{BB962C8B-B14F-4D97-AF65-F5344CB8AC3E}">
+        <p14:creationId xmlns:p14="http://schemas.microsoft.com/office/powerpoint/2010/main" val="4043842048"/>
+      </p:ext>
+    </p:extLst>
+  </p:cSld>
+  <p:clrMapOvr>
+    <a:masterClrMapping/>
+  </p:clrMapOvr>
+</p:sld>
+</file>
+
+<file path=ppt/slides/slide18.xml><?xml version="1.0" encoding="utf-8"?>
+<p:sld xmlns:a="http://schemas.openxmlformats.org/drawingml/2006/main" xmlns:r="http://schemas.openxmlformats.org/officeDocument/2006/relationships" xmlns:p="http://schemas.openxmlformats.org/presentationml/2006/main">
+  <p:cSld>
+    <p:spTree>
+      <p:nvGrpSpPr>
+        <p:cNvPr id="1" name=""/>
+        <p:cNvGrpSpPr/>
+        <p:nvPr/>
+      </p:nvGrpSpPr>
+      <p:grpSpPr>
+        <a:xfrm>
+          <a:off x="0" y="0"/>
+          <a:ext cx="0" cy="0"/>
+          <a:chOff x="0" y="0"/>
+          <a:chExt cx="0" cy="0"/>
+        </a:xfrm>
+      </p:grpSpPr>
+      <p:sp>
+        <p:nvSpPr>
+          <p:cNvPr id="2" name="Title 1">
+            <a:extLst>
+              <a:ext uri="{FF2B5EF4-FFF2-40B4-BE49-F238E27FC236}">
+                <a16:creationId xmlns:a16="http://schemas.microsoft.com/office/drawing/2014/main" id="{560C5AC7-325E-4C6C-832B-6E869089B727}"/>
+              </a:ext>
+            </a:extLst>
+          </p:cNvPr>
+          <p:cNvSpPr>
+            <a:spLocks noGrp="1"/>
+          </p:cNvSpPr>
+          <p:nvPr>
+            <p:ph type="title"/>
+          </p:nvPr>
+        </p:nvSpPr>
+        <p:spPr/>
+        <p:txBody>
+          <a:bodyPr>
+            <a:normAutofit/>
+          </a:bodyPr>
+          <a:lstStyle/>
+          <a:p>
+            <a:r>
+              <a:rPr lang="en-US" dirty="0">
+                <a:effectLst/>
+              </a:rPr>
+              <a:t>CRTP – Why use it?</a:t>
+            </a:r>
+            <a:endParaRPr lang="en-US" dirty="0"/>
+          </a:p>
+        </p:txBody>
+      </p:sp>
+      <p:sp>
+        <p:nvSpPr>
+          <p:cNvPr id="3" name="Content Placeholder 2">
+            <a:extLst>
+              <a:ext uri="{FF2B5EF4-FFF2-40B4-BE49-F238E27FC236}">
+                <a16:creationId xmlns:a16="http://schemas.microsoft.com/office/drawing/2014/main" id="{5D065A81-9E6D-4C15-9E6B-62E02CCAC109}"/>
+              </a:ext>
+            </a:extLst>
+          </p:cNvPr>
+          <p:cNvSpPr>
+            <a:spLocks noGrp="1"/>
+          </p:cNvSpPr>
+          <p:nvPr>
+            <p:ph idx="1"/>
+          </p:nvPr>
+        </p:nvSpPr>
+        <p:spPr>
+          <a:xfrm>
+            <a:off x="385011" y="1732449"/>
+            <a:ext cx="11466094" cy="4800698"/>
+          </a:xfrm>
+        </p:spPr>
+        <p:txBody>
+          <a:bodyPr>
+            <a:normAutofit/>
+          </a:bodyPr>
+          <a:lstStyle/>
+          <a:p>
+            <a:pPr indent="-342900">
+              <a:spcBef>
+                <a:spcPts val="0"/>
+              </a:spcBef>
+              <a:spcAft>
+                <a:spcPts val="0"/>
+              </a:spcAft>
+            </a:pPr>
+            <a:r>
+              <a:rPr lang="en-US" dirty="0">
+                <a:effectLst/>
+              </a:rPr>
+              <a:t>To enforce concepts?</a:t>
+            </a:r>
+          </a:p>
+          <a:p>
+            <a:pPr lvl="1" indent="-342900">
+              <a:spcBef>
+                <a:spcPts val="0"/>
+              </a:spcBef>
+              <a:spcAft>
+                <a:spcPts val="0"/>
+              </a:spcAft>
+            </a:pPr>
+            <a:r>
+              <a:rPr lang="en-US" dirty="0">
+                <a:effectLst/>
+              </a:rPr>
+              <a:t>Maybe not… Value semantics + slicing or reference semantics; pick one</a:t>
+            </a:r>
             <a:br>
               <a:rPr lang="en-US" dirty="0">
                 <a:effectLst/>
@@ -11897,10 +12755,10 @@
               </a:spcAft>
             </a:pPr>
             <a:r>
-              <a:rPr lang="en-US" b="1" dirty="0">
-                <a:effectLst/>
-              </a:rPr>
-              <a:t>Class extension or code re-use</a:t>
+              <a:rPr lang="en-US" dirty="0">
+                <a:effectLst/>
+              </a:rPr>
+              <a:t>Class extension</a:t>
             </a:r>
           </a:p>
           <a:p>

</xml_diff>